<commit_message>
Mild tweak to the presentation file
</commit_message>
<xml_diff>
--- a/Seasonal flu prediction model.pptx
+++ b/Seasonal flu prediction model.pptx
@@ -5,21 +5,22 @@
     <p:sldMasterId id="2147483648" r:id="rId1"/>
   </p:sldMasterIdLst>
   <p:notesMasterIdLst>
-    <p:notesMasterId r:id="rId11"/>
+    <p:notesMasterId r:id="rId12"/>
   </p:notesMasterIdLst>
   <p:handoutMasterIdLst>
-    <p:handoutMasterId r:id="rId12"/>
+    <p:handoutMasterId r:id="rId13"/>
   </p:handoutMasterIdLst>
   <p:sldIdLst>
     <p:sldId id="256" r:id="rId2"/>
     <p:sldId id="262" r:id="rId3"/>
-    <p:sldId id="267" r:id="rId4"/>
-    <p:sldId id="272" r:id="rId5"/>
-    <p:sldId id="268" r:id="rId6"/>
-    <p:sldId id="269" r:id="rId7"/>
-    <p:sldId id="270" r:id="rId8"/>
-    <p:sldId id="271" r:id="rId9"/>
-    <p:sldId id="264" r:id="rId10"/>
+    <p:sldId id="273" r:id="rId4"/>
+    <p:sldId id="267" r:id="rId5"/>
+    <p:sldId id="272" r:id="rId6"/>
+    <p:sldId id="268" r:id="rId7"/>
+    <p:sldId id="269" r:id="rId8"/>
+    <p:sldId id="270" r:id="rId9"/>
+    <p:sldId id="271" r:id="rId10"/>
+    <p:sldId id="264" r:id="rId11"/>
   </p:sldIdLst>
   <p:sldSz cx="12192000" cy="6858000"/>
   <p:notesSz cx="6858000" cy="9144000"/>
@@ -222,7 +223,7 @@
           <a:p>
             <a:fld id="{043B725B-653D-4166-A8E9-72A38A1847CF}" type="datetimeFigureOut">
               <a:rPr lang="en-US"/>
-              <a:t>2/11/2023</a:t>
+              <a:t>2/12/2023</a:t>
             </a:fld>
             <a:endParaRPr/>
           </a:p>
@@ -387,7 +388,7 @@
           <a:p>
             <a:fld id="{783F64CD-0576-4A9A-BD06-7889D6E60BDC}" type="datetimeFigureOut">
               <a:rPr lang="en-US"/>
-              <a:t>2/11/2023</a:t>
+              <a:t>2/12/2023</a:t>
             </a:fld>
             <a:endParaRPr/>
           </a:p>
@@ -985,7 +986,7 @@
           <a:p>
             <a:fld id="{37CC0096-1860-4642-9CD2-0079EA5E7CD1}" type="datetimeFigureOut">
               <a:rPr lang="en-US"/>
-              <a:t>2/11/2023</a:t>
+              <a:t>2/12/2023</a:t>
             </a:fld>
             <a:endParaRPr/>
           </a:p>
@@ -1234,7 +1235,7 @@
           <a:p>
             <a:fld id="{37CC0096-1860-4642-9CD2-0079EA5E7CD1}" type="datetimeFigureOut">
               <a:rPr lang="en-US"/>
-              <a:t>2/11/2023</a:t>
+              <a:t>2/12/2023</a:t>
             </a:fld>
             <a:endParaRPr/>
           </a:p>
@@ -1420,7 +1421,7 @@
           <a:p>
             <a:fld id="{37CC0096-1860-4642-9CD2-0079EA5E7CD1}" type="datetimeFigureOut">
               <a:rPr lang="en-US"/>
-              <a:t>2/11/2023</a:t>
+              <a:t>2/12/2023</a:t>
             </a:fld>
             <a:endParaRPr/>
           </a:p>
@@ -1951,7 +1952,7 @@
           <a:p>
             <a:fld id="{37CC0096-1860-4642-9CD2-0079EA5E7CD1}" type="datetimeFigureOut">
               <a:rPr lang="en-US"/>
-              <a:t>2/11/2023</a:t>
+              <a:t>2/12/2023</a:t>
             </a:fld>
             <a:endParaRPr/>
           </a:p>
@@ -2403,7 +2404,7 @@
           <a:p>
             <a:fld id="{37CC0096-1860-4642-9CD2-0079EA5E7CD1}" type="datetimeFigureOut">
               <a:rPr lang="en-US"/>
-              <a:t>2/11/2023</a:t>
+              <a:t>2/12/2023</a:t>
             </a:fld>
             <a:endParaRPr/>
           </a:p>
@@ -2533,7 +2534,7 @@
           <a:p>
             <a:fld id="{37CC0096-1860-4642-9CD2-0079EA5E7CD1}" type="datetimeFigureOut">
               <a:rPr lang="en-US"/>
-              <a:t>2/11/2023</a:t>
+              <a:t>2/12/2023</a:t>
             </a:fld>
             <a:endParaRPr/>
           </a:p>
@@ -2640,7 +2641,7 @@
           <a:p>
             <a:fld id="{37CC0096-1860-4642-9CD2-0079EA5E7CD1}" type="datetimeFigureOut">
               <a:rPr lang="en-US"/>
-              <a:t>2/11/2023</a:t>
+              <a:t>2/12/2023</a:t>
             </a:fld>
             <a:endParaRPr/>
           </a:p>
@@ -3629,7 +3630,7 @@
             <a:fld id="{37CC0096-1860-4642-9CD2-0079EA5E7CD1}" type="datetimeFigureOut">
               <a:rPr lang="en-US" smtClean="0"/>
               <a:pPr/>
-              <a:t>2/11/2023</a:t>
+              <a:t>2/12/2023</a:t>
             </a:fld>
             <a:endParaRPr lang="en-US" dirty="0"/>
           </a:p>
@@ -4129,6 +4130,124 @@
 </p:sld>
 </file>
 
+<file path=ppt/slides/slide10.xml><?xml version="1.0" encoding="utf-8"?>
+<p:sld xmlns:a="http://schemas.openxmlformats.org/drawingml/2006/main" xmlns:r="http://schemas.openxmlformats.org/officeDocument/2006/relationships" xmlns:p="http://schemas.openxmlformats.org/presentationml/2006/main">
+  <p:cSld>
+    <p:spTree>
+      <p:nvGrpSpPr>
+        <p:cNvPr id="1" name=""/>
+        <p:cNvGrpSpPr/>
+        <p:nvPr/>
+      </p:nvGrpSpPr>
+      <p:grpSpPr>
+        <a:xfrm>
+          <a:off x="0" y="0"/>
+          <a:ext cx="0" cy="0"/>
+          <a:chOff x="0" y="0"/>
+          <a:chExt cx="0" cy="0"/>
+        </a:xfrm>
+      </p:grpSpPr>
+      <p:sp>
+        <p:nvSpPr>
+          <p:cNvPr id="11" name="Title 1">
+            <a:extLst>
+              <a:ext uri="{FF2B5EF4-FFF2-40B4-BE49-F238E27FC236}">
+                <a16:creationId xmlns:a16="http://schemas.microsoft.com/office/drawing/2014/main" id="{78C49FFF-AD89-0908-F61F-67ADCBEEF8B2}"/>
+              </a:ext>
+            </a:extLst>
+          </p:cNvPr>
+          <p:cNvSpPr>
+            <a:spLocks noGrp="1"/>
+          </p:cNvSpPr>
+          <p:nvPr>
+            <p:ph type="title"/>
+          </p:nvPr>
+        </p:nvSpPr>
+        <p:spPr>
+          <a:xfrm>
+            <a:off x="1066800" y="99220"/>
+            <a:ext cx="10058400" cy="1325563"/>
+          </a:xfrm>
+        </p:spPr>
+        <p:txBody>
+          <a:bodyPr/>
+          <a:lstStyle/>
+          <a:p>
+            <a:r>
+              <a:rPr lang="en-US" dirty="0"/>
+              <a:t>Conclusion</a:t>
+            </a:r>
+          </a:p>
+        </p:txBody>
+      </p:sp>
+      <p:sp>
+        <p:nvSpPr>
+          <p:cNvPr id="13" name="Content Placeholder 2">
+            <a:extLst>
+              <a:ext uri="{FF2B5EF4-FFF2-40B4-BE49-F238E27FC236}">
+                <a16:creationId xmlns:a16="http://schemas.microsoft.com/office/drawing/2014/main" id="{C06FE100-7545-A1C5-D714-3F554B949A54}"/>
+              </a:ext>
+            </a:extLst>
+          </p:cNvPr>
+          <p:cNvSpPr>
+            <a:spLocks noGrp="1"/>
+          </p:cNvSpPr>
+          <p:nvPr>
+            <p:ph idx="1"/>
+          </p:nvPr>
+        </p:nvSpPr>
+        <p:spPr>
+          <a:xfrm>
+            <a:off x="1524000" y="1828799"/>
+            <a:ext cx="9144000" cy="4572001"/>
+          </a:xfrm>
+        </p:spPr>
+        <p:txBody>
+          <a:bodyPr>
+            <a:normAutofit/>
+          </a:bodyPr>
+          <a:lstStyle/>
+          <a:p>
+            <a:pPr>
+              <a:lnSpc>
+                <a:spcPct val="150000"/>
+              </a:lnSpc>
+            </a:pPr>
+            <a:r>
+              <a:rPr lang="en-US" sz="1900" dirty="0">
+                <a:latin typeface="Times New Roman" panose="02020603050405020304" pitchFamily="18" charset="0"/>
+                <a:cs typeface="Times New Roman" panose="02020603050405020304" pitchFamily="18" charset="0"/>
+              </a:rPr>
+              <a:t>Yes, the model did well, but I believe with what we have seen from the individual models, if we were to combine their strengths and potentially avoid some of their weaknesses through an ensembled model, we would have an aggregate that would surpass the logistic regression.</a:t>
+            </a:r>
+          </a:p>
+        </p:txBody>
+      </p:sp>
+    </p:spTree>
+    <p:extLst>
+      <p:ext uri="{BB962C8B-B14F-4D97-AF65-F5344CB8AC3E}">
+        <p14:creationId xmlns:p14="http://schemas.microsoft.com/office/powerpoint/2010/main" val="1001865620"/>
+      </p:ext>
+    </p:extLst>
+  </p:cSld>
+  <p:clrMapOvr>
+    <a:masterClrMapping/>
+  </p:clrMapOvr>
+  <mc:AlternateContent xmlns:mc="http://schemas.openxmlformats.org/markup-compatibility/2006" xmlns:p14="http://schemas.microsoft.com/office/powerpoint/2010/main">
+    <mc:Choice Requires="p14">
+      <p:transition spd="med" p14:dur="700">
+        <p:fade/>
+      </p:transition>
+    </mc:Choice>
+    <mc:Fallback xmlns="">
+      <p:transition spd="med">
+        <p:fade/>
+      </p:transition>
+    </mc:Fallback>
+  </mc:AlternateContent>
+</p:sld>
+</file>
+
 <file path=ppt/slides/slide2.xml><?xml version="1.0" encoding="utf-8"?>
 <p:sld xmlns:a="http://schemas.openxmlformats.org/drawingml/2006/main" xmlns:r="http://schemas.openxmlformats.org/officeDocument/2006/relationships" xmlns:p="http://schemas.openxmlformats.org/presentationml/2006/main">
   <p:cSld>
@@ -4180,21 +4299,24 @@
         </p:nvSpPr>
         <p:spPr>
           <a:xfrm>
-            <a:off x="1066800" y="2590799"/>
-            <a:ext cx="8458200" cy="3810033"/>
+            <a:off x="1066800" y="2057401"/>
+            <a:ext cx="8458200" cy="3429000"/>
           </a:xfrm>
         </p:spPr>
         <p:txBody>
           <a:bodyPr>
-            <a:normAutofit fontScale="77500" lnSpcReduction="20000"/>
+            <a:noAutofit/>
           </a:bodyPr>
           <a:lstStyle/>
           <a:p>
             <a:pPr marL="0" indent="0" rtl="0">
+              <a:lnSpc>
+                <a:spcPct val="170000"/>
+              </a:lnSpc>
               <a:buNone/>
             </a:pPr>
             <a:r>
-              <a:rPr lang="en-US" b="1" dirty="0">
+              <a:rPr lang="en-US" sz="1900" b="1" dirty="0">
                 <a:solidFill>
                   <a:srgbClr val="000000"/>
                 </a:solidFill>
@@ -4206,9 +4328,13 @@
             </a:r>
           </a:p>
           <a:p>
-            <a:pPr algn="l" rtl="0"/>
-            <a:r>
-              <a:rPr lang="en-US" dirty="0">
+            <a:pPr algn="l" rtl="0">
+              <a:lnSpc>
+                <a:spcPct val="170000"/>
+              </a:lnSpc>
+            </a:pPr>
+            <a:r>
+              <a:rPr lang="en-US" sz="1900" dirty="0">
                 <a:solidFill>
                   <a:srgbClr val="000000"/>
                 </a:solidFill>
@@ -4221,58 +4347,12 @@
           </a:p>
           <a:p>
             <a:pPr marL="0" indent="0" rtl="0">
+              <a:lnSpc>
+                <a:spcPct val="170000"/>
+              </a:lnSpc>
               <a:buNone/>
             </a:pPr>
-            <a:r>
-              <a:rPr lang="en-US" b="1" dirty="0">
-                <a:solidFill>
-                  <a:srgbClr val="000000"/>
-                </a:solidFill>
-                <a:effectLst/>
-                <a:latin typeface="Times New Roman" panose="02020603050405020304" pitchFamily="18" charset="0"/>
-                <a:cs typeface="Times New Roman" panose="02020603050405020304" pitchFamily="18" charset="0"/>
-              </a:rPr>
-              <a:t>Desired outcome:</a:t>
-            </a:r>
-          </a:p>
-          <a:p>
-            <a:pPr algn="l" rtl="0"/>
-            <a:r>
-              <a:rPr lang="en-US" dirty="0">
-                <a:solidFill>
-                  <a:srgbClr val="000000"/>
-                </a:solidFill>
-                <a:effectLst/>
-                <a:latin typeface="Times New Roman" panose="02020603050405020304" pitchFamily="18" charset="0"/>
-                <a:cs typeface="Times New Roman" panose="02020603050405020304" pitchFamily="18" charset="0"/>
-              </a:rPr>
-              <a:t>Create a model that can accurately predict whether a person, based on their attributes given in the data both categorical and continuous is most likely given the seasonal flu (or depending if there is time, the H1N1) vaccine(s).</a:t>
-            </a:r>
-          </a:p>
-          <a:p>
-            <a:pPr algn="l" rtl="0"/>
-            <a:r>
-              <a:rPr lang="en-US" dirty="0">
-                <a:solidFill>
-                  <a:srgbClr val="000000"/>
-                </a:solidFill>
-                <a:effectLst/>
-                <a:latin typeface="Times New Roman" panose="02020603050405020304" pitchFamily="18" charset="0"/>
-                <a:cs typeface="Times New Roman" panose="02020603050405020304" pitchFamily="18" charset="0"/>
-              </a:rPr>
-              <a:t>Eventually, the prediction algorithm can be used in identifying people with potential illness to the seasonal flu and either prevent or have a concrete solution in place due to early detection.</a:t>
-            </a:r>
-            <a:br>
-              <a:rPr lang="en-US" b="0" i="0" dirty="0">
-                <a:solidFill>
-                  <a:srgbClr val="000000"/>
-                </a:solidFill>
-                <a:effectLst/>
-                <a:latin typeface="Times New Roman" panose="02020603050405020304" pitchFamily="18" charset="0"/>
-                <a:cs typeface="Times New Roman" panose="02020603050405020304" pitchFamily="18" charset="0"/>
-              </a:rPr>
-            </a:br>
-            <a:endParaRPr lang="en-US" dirty="0">
+            <a:endParaRPr lang="en-US" sz="1900" dirty="0">
               <a:latin typeface="Times New Roman" panose="02020603050405020304" pitchFamily="18" charset="0"/>
               <a:cs typeface="Times New Roman" panose="02020603050405020304" pitchFamily="18" charset="0"/>
             </a:endParaRPr>
@@ -4336,13 +4416,9 @@
           <a:bodyPr/>
           <a:lstStyle/>
           <a:p>
-            <a:pPr algn="l"/>
-            <a:r>
-              <a:rPr lang="en-US" b="1" i="0" dirty="0">
-                <a:effectLst/>
-                <a:latin typeface="Helvetica Neue"/>
-              </a:rPr>
-              <a:t>2. Data </a:t>
+            <a:r>
+              <a:rPr lang="en-US" dirty="0"/>
+              <a:t>1. Business Understanding</a:t>
             </a:r>
           </a:p>
         </p:txBody>
@@ -4359,61 +4435,103 @@
         </p:nvSpPr>
         <p:spPr>
           <a:xfrm>
-            <a:off x="1066800" y="2590799"/>
-            <a:ext cx="9067800" cy="3810033"/>
+            <a:off x="1066800" y="2057401"/>
+            <a:ext cx="8458200" cy="3429000"/>
           </a:xfrm>
         </p:spPr>
         <p:txBody>
           <a:bodyPr>
-            <a:normAutofit/>
+            <a:noAutofit/>
           </a:bodyPr>
           <a:lstStyle/>
           <a:p>
-            <a:r>
-              <a:rPr lang="en-US" sz="2000" dirty="0">
+            <a:pPr marL="0" indent="0" rtl="0">
+              <a:lnSpc>
+                <a:spcPct val="170000"/>
+              </a:lnSpc>
+              <a:buNone/>
+            </a:pPr>
+            <a:r>
+              <a:rPr lang="en-US" sz="1900" b="1" dirty="0">
+                <a:solidFill>
+                  <a:srgbClr val="000000"/>
+                </a:solidFill>
+                <a:effectLst/>
                 <a:latin typeface="Times New Roman" panose="02020603050405020304" pitchFamily="18" charset="0"/>
                 <a:cs typeface="Times New Roman" panose="02020603050405020304" pitchFamily="18" charset="0"/>
               </a:rPr>
-              <a:t>The data consists of features/ variables that describe the outcome we want to predict i.e., Seasonal flu vaccinated or unvaccinated.</a:t>
-            </a:r>
-          </a:p>
-          <a:p>
-            <a:r>
-              <a:rPr lang="en-US" sz="2000" dirty="0">
+              <a:t>Desired outcome:</a:t>
+            </a:r>
+          </a:p>
+          <a:p>
+            <a:pPr algn="l" rtl="0">
+              <a:lnSpc>
+                <a:spcPct val="170000"/>
+              </a:lnSpc>
+            </a:pPr>
+            <a:r>
+              <a:rPr lang="en-US" sz="1900" dirty="0">
+                <a:solidFill>
+                  <a:srgbClr val="000000"/>
+                </a:solidFill>
+                <a:effectLst/>
                 <a:latin typeface="Times New Roman" panose="02020603050405020304" pitchFamily="18" charset="0"/>
                 <a:cs typeface="Times New Roman" panose="02020603050405020304" pitchFamily="18" charset="0"/>
               </a:rPr>
-              <a:t>Due to the balanced data, the goal of the prediction was to focus on the model’s ability to achieve accuracy.</a:t>
-            </a:r>
-          </a:p>
-          <a:p>
-            <a:r>
-              <a:rPr lang="en-US" sz="2000" dirty="0">
+              <a:t>Create a model that can accurately predict whether a person, based on their attributes given in the data both categorical and continuous is most likely given the seasonal flu (or depending if there is time, the H1N1) vaccine(s).</a:t>
+            </a:r>
+          </a:p>
+          <a:p>
+            <a:pPr algn="l" rtl="0">
+              <a:lnSpc>
+                <a:spcPct val="170000"/>
+              </a:lnSpc>
+            </a:pPr>
+            <a:r>
+              <a:rPr lang="en-US" sz="1900" dirty="0">
+                <a:solidFill>
+                  <a:srgbClr val="000000"/>
+                </a:solidFill>
+                <a:effectLst/>
                 <a:latin typeface="Times New Roman" panose="02020603050405020304" pitchFamily="18" charset="0"/>
                 <a:cs typeface="Times New Roman" panose="02020603050405020304" pitchFamily="18" charset="0"/>
               </a:rPr>
-              <a:t>The </a:t>
-            </a:r>
+              <a:t>Eventually, the prediction algorithm can be used in identifying people with potential illness to the seasonal flu and either prevent or have a concrete solution in place due to early detection.</a:t>
+            </a:r>
+            <a:br>
+              <a:rPr lang="en-US" sz="1900" b="0" i="0" dirty="0">
+                <a:solidFill>
+                  <a:srgbClr val="000000"/>
+                </a:solidFill>
+                <a:effectLst/>
+                <a:latin typeface="Times New Roman" panose="02020603050405020304" pitchFamily="18" charset="0"/>
+                <a:cs typeface="Times New Roman" panose="02020603050405020304" pitchFamily="18" charset="0"/>
+              </a:rPr>
+            </a:br>
+            <a:endParaRPr lang="en-US" sz="1900" dirty="0">
+              <a:latin typeface="Times New Roman" panose="02020603050405020304" pitchFamily="18" charset="0"/>
+              <a:cs typeface="Times New Roman" panose="02020603050405020304" pitchFamily="18" charset="0"/>
+            </a:endParaRPr>
           </a:p>
         </p:txBody>
       </p:sp>
     </p:spTree>
     <p:extLst>
       <p:ext uri="{BB962C8B-B14F-4D97-AF65-F5344CB8AC3E}">
-        <p14:creationId xmlns:p14="http://schemas.microsoft.com/office/powerpoint/2010/main" val="1228104392"/>
+        <p14:creationId xmlns:p14="http://schemas.microsoft.com/office/powerpoint/2010/main" val="1807710607"/>
       </p:ext>
     </p:extLst>
   </p:cSld>
   <p:clrMapOvr>
     <a:masterClrMapping/>
   </p:clrMapOvr>
-  <mc:AlternateContent xmlns:mc="http://schemas.openxmlformats.org/markup-compatibility/2006" xmlns:p14="http://schemas.microsoft.com/office/powerpoint/2010/main">
-    <mc:Choice Requires="p14">
+  <mc:AlternateContent xmlns:mc="http://schemas.openxmlformats.org/markup-compatibility/2006">
+    <mc:Choice xmlns:p14="http://schemas.microsoft.com/office/powerpoint/2010/main" Requires="p14">
       <p:transition spd="med" p14:dur="700">
         <p:fade/>
       </p:transition>
     </mc:Choice>
-    <mc:Fallback xmlns="">
+    <mc:Fallback>
       <p:transition spd="med">
         <p:fade/>
       </p:transition>
@@ -4482,20 +4600,44 @@
           </a:xfrm>
         </p:spPr>
         <p:txBody>
-          <a:bodyPr/>
+          <a:bodyPr>
+            <a:normAutofit/>
+          </a:bodyPr>
           <a:lstStyle/>
           <a:p>
-            <a:pPr marL="0" indent="0">
-              <a:buNone/>
+            <a:pPr>
+              <a:lnSpc>
+                <a:spcPct val="150000"/>
+              </a:lnSpc>
             </a:pPr>
-            <a:endParaRPr lang="en-US" dirty="0"/>
+            <a:r>
+              <a:rPr lang="en-US" sz="1900" dirty="0">
+                <a:latin typeface="Times New Roman" panose="02020603050405020304" pitchFamily="18" charset="0"/>
+                <a:cs typeface="Times New Roman" panose="02020603050405020304" pitchFamily="18" charset="0"/>
+              </a:rPr>
+              <a:t>The data consists of features/ variables that describe the outcome we want to predict i.e., Seasonal flu vaccinated or unvaccinated.</a:t>
+            </a:r>
+          </a:p>
+          <a:p>
+            <a:pPr>
+              <a:lnSpc>
+                <a:spcPct val="150000"/>
+              </a:lnSpc>
+            </a:pPr>
+            <a:r>
+              <a:rPr lang="en-US" sz="1900" dirty="0">
+                <a:latin typeface="Times New Roman" panose="02020603050405020304" pitchFamily="18" charset="0"/>
+                <a:cs typeface="Times New Roman" panose="02020603050405020304" pitchFamily="18" charset="0"/>
+              </a:rPr>
+              <a:t>Due to the balanced data, the goal of the prediction was to focus on the model’s ability to achieve accuracy.</a:t>
+            </a:r>
           </a:p>
         </p:txBody>
       </p:sp>
     </p:spTree>
     <p:extLst>
       <p:ext uri="{BB962C8B-B14F-4D97-AF65-F5344CB8AC3E}">
-        <p14:creationId xmlns:p14="http://schemas.microsoft.com/office/powerpoint/2010/main" val="2113619193"/>
+        <p14:creationId xmlns:p14="http://schemas.microsoft.com/office/powerpoint/2010/main" val="1228104392"/>
       </p:ext>
     </p:extLst>
   </p:cSld>
@@ -4544,100 +4686,111 @@
             <p:ph type="title"/>
           </p:nvPr>
         </p:nvSpPr>
-        <p:spPr/>
-        <p:txBody>
-          <a:bodyPr/>
-          <a:lstStyle/>
-          <a:p>
-            <a:pPr algn="l"/>
-            <a:r>
-              <a:rPr lang="en-US" b="1" i="0" dirty="0">
-                <a:effectLst/>
-                <a:latin typeface="Helvetica Neue"/>
-              </a:rPr>
-              <a:t>3. Methods</a:t>
-            </a:r>
-          </a:p>
-        </p:txBody>
-      </p:sp>
-      <p:sp>
-        <p:nvSpPr>
-          <p:cNvPr id="4" name="Content Placeholder 3"/>
-          <p:cNvSpPr>
-            <a:spLocks noGrp="1"/>
-          </p:cNvSpPr>
-          <p:nvPr>
-            <p:ph sz="half" idx="2"/>
-          </p:nvPr>
-        </p:nvSpPr>
         <p:spPr>
           <a:xfrm>
-            <a:off x="1066800" y="2590799"/>
-            <a:ext cx="8686800" cy="3810033"/>
+            <a:off x="7635240" y="3200400"/>
+            <a:ext cx="3932237" cy="1752600"/>
           </a:xfrm>
         </p:spPr>
         <p:txBody>
-          <a:bodyPr>
+          <a:bodyPr anchor="b">
             <a:normAutofit/>
           </a:bodyPr>
           <a:lstStyle/>
           <a:p>
             <a:r>
-              <a:rPr lang="en-US" sz="1900" dirty="0">
-                <a:latin typeface="Times New Roman" panose="02020603050405020304" pitchFamily="18" charset="0"/>
-                <a:cs typeface="Times New Roman" panose="02020603050405020304" pitchFamily="18" charset="0"/>
+              <a:rPr lang="en-US" b="1" i="0">
+                <a:effectLst/>
               </a:rPr>
-              <a:t>The methods used to build the classification model are: Logistic Regression, Decision Tree Classifier, and Gaussian Naïve Bayes Classifier.</a:t>
-            </a:r>
-          </a:p>
-          <a:p>
-            <a:r>
-              <a:rPr lang="en-US" sz="1900" dirty="0">
-                <a:latin typeface="Times New Roman" panose="02020603050405020304" pitchFamily="18" charset="0"/>
-                <a:cs typeface="Times New Roman" panose="02020603050405020304" pitchFamily="18" charset="0"/>
-              </a:rPr>
-              <a:t>All the 3 methods were trained from data prepped from a train split. This ensured that we would have less chances of overfitting the model and having poor performance on the test set.</a:t>
-            </a:r>
-          </a:p>
-          <a:p>
-            <a:r>
-              <a:rPr lang="en-US" sz="1900" dirty="0">
-                <a:latin typeface="Times New Roman" panose="02020603050405020304" pitchFamily="18" charset="0"/>
-                <a:cs typeface="Times New Roman" panose="02020603050405020304" pitchFamily="18" charset="0"/>
-              </a:rPr>
-              <a:t>Each of the methods had their own levels of tuning with their </a:t>
-            </a:r>
-            <a:r>
-              <a:rPr lang="en-US" sz="1900">
-                <a:latin typeface="Times New Roman" panose="02020603050405020304" pitchFamily="18" charset="0"/>
-                <a:cs typeface="Times New Roman" panose="02020603050405020304" pitchFamily="18" charset="0"/>
-              </a:rPr>
-              <a:t>own respective </a:t>
-            </a:r>
-            <a:endParaRPr lang="en-US" sz="1900" dirty="0">
-              <a:latin typeface="Times New Roman" panose="02020603050405020304" pitchFamily="18" charset="0"/>
-              <a:cs typeface="Times New Roman" panose="02020603050405020304" pitchFamily="18" charset="0"/>
-            </a:endParaRPr>
+              <a:t>2. Data </a:t>
+            </a:r>
+          </a:p>
+        </p:txBody>
+      </p:sp>
+      <p:pic>
+        <p:nvPicPr>
+          <p:cNvPr id="5" name="Content Placeholder 4" descr="A picture containing table&#10;&#10;Description automatically generated">
+            <a:extLst>
+              <a:ext uri="{FF2B5EF4-FFF2-40B4-BE49-F238E27FC236}">
+                <a16:creationId xmlns:a16="http://schemas.microsoft.com/office/drawing/2014/main" id="{14F2DFC0-BC54-9840-C593-11A26A615E75}"/>
+              </a:ext>
+            </a:extLst>
+          </p:cNvPr>
+          <p:cNvPicPr>
+            <a:picLocks noGrp="1" noChangeAspect="1"/>
+          </p:cNvPicPr>
+          <p:nvPr>
+            <p:ph type="pic" idx="1"/>
+          </p:nvPr>
+        </p:nvPicPr>
+        <p:blipFill rotWithShape="1">
+          <a:blip r:embed="rId2">
+            <a:extLst>
+              <a:ext uri="{28A0092B-C50C-407E-A947-70E740481C1C}">
+                <a14:useLocalDpi xmlns:a14="http://schemas.microsoft.com/office/drawing/2010/main" val="0"/>
+              </a:ext>
+            </a:extLst>
+          </a:blip>
+          <a:stretch/>
+        </p:blipFill>
+        <p:spPr>
+          <a:xfrm>
+            <a:off x="1" y="862023"/>
+            <a:ext cx="7008810" cy="5133952"/>
+          </a:xfrm>
+          <a:noFill/>
+        </p:spPr>
+      </p:pic>
+      <p:sp>
+        <p:nvSpPr>
+          <p:cNvPr id="10" name="Text Placeholder 3">
+            <a:extLst>
+              <a:ext uri="{FF2B5EF4-FFF2-40B4-BE49-F238E27FC236}">
+                <a16:creationId xmlns:a16="http://schemas.microsoft.com/office/drawing/2014/main" id="{1936D909-9787-643B-FA66-723C8416B1AD}"/>
+              </a:ext>
+            </a:extLst>
+          </p:cNvPr>
+          <p:cNvSpPr>
+            <a:spLocks noGrp="1"/>
+          </p:cNvSpPr>
+          <p:nvPr>
+            <p:ph type="body" sz="half" idx="2"/>
+          </p:nvPr>
+        </p:nvSpPr>
+        <p:spPr>
+          <a:xfrm>
+            <a:off x="7635240" y="5029200"/>
+            <a:ext cx="3932237" cy="1374648"/>
+          </a:xfrm>
+        </p:spPr>
+        <p:txBody>
+          <a:bodyPr/>
+          <a:lstStyle/>
+          <a:p>
+            <a:r>
+              <a:rPr lang="en-US" dirty="0"/>
+              <a:t>Layout of the columns and the data shape of the dataset.</a:t>
+            </a:r>
           </a:p>
         </p:txBody>
       </p:sp>
     </p:spTree>
     <p:extLst>
       <p:ext uri="{BB962C8B-B14F-4D97-AF65-F5344CB8AC3E}">
-        <p14:creationId xmlns:p14="http://schemas.microsoft.com/office/powerpoint/2010/main" val="1689957781"/>
+        <p14:creationId xmlns:p14="http://schemas.microsoft.com/office/powerpoint/2010/main" val="1895791333"/>
       </p:ext>
     </p:extLst>
   </p:cSld>
   <p:clrMapOvr>
     <a:masterClrMapping/>
   </p:clrMapOvr>
-  <mc:AlternateContent xmlns:mc="http://schemas.openxmlformats.org/markup-compatibility/2006" xmlns:p14="http://schemas.microsoft.com/office/powerpoint/2010/main">
-    <mc:Choice Requires="p14">
+  <mc:AlternateContent xmlns:mc="http://schemas.openxmlformats.org/markup-compatibility/2006">
+    <mc:Choice xmlns:p14="http://schemas.microsoft.com/office/powerpoint/2010/main" Requires="p14">
       <p:transition spd="med" p14:dur="700">
         <p:fade/>
       </p:transition>
     </mc:Choice>
-    <mc:Fallback xmlns="">
+    <mc:Fallback>
       <p:transition spd="med">
         <p:fade/>
       </p:transition>
@@ -4673,103 +4826,83 @@
             <p:ph type="title"/>
           </p:nvPr>
         </p:nvSpPr>
+        <p:spPr/>
+        <p:txBody>
+          <a:bodyPr/>
+          <a:lstStyle/>
+          <a:p>
+            <a:pPr algn="l"/>
+            <a:r>
+              <a:rPr lang="en-US" b="1" i="0" dirty="0">
+                <a:effectLst/>
+                <a:latin typeface="Helvetica Neue"/>
+              </a:rPr>
+              <a:t>3. Methods</a:t>
+            </a:r>
+          </a:p>
+        </p:txBody>
+      </p:sp>
+      <p:sp>
+        <p:nvSpPr>
+          <p:cNvPr id="4" name="Content Placeholder 3"/>
+          <p:cNvSpPr>
+            <a:spLocks noGrp="1"/>
+          </p:cNvSpPr>
+          <p:nvPr>
+            <p:ph sz="half" idx="2"/>
+          </p:nvPr>
+        </p:nvSpPr>
         <p:spPr>
           <a:xfrm>
-            <a:off x="1066800" y="99220"/>
-            <a:ext cx="10058400" cy="1325563"/>
+            <a:off x="1066800" y="2209800"/>
+            <a:ext cx="8686800" cy="3810033"/>
           </a:xfrm>
         </p:spPr>
         <p:txBody>
-          <a:bodyPr anchor="ctr">
-            <a:normAutofit/>
+          <a:bodyPr>
+            <a:normAutofit fontScale="92500"/>
           </a:bodyPr>
           <a:lstStyle/>
           <a:p>
-            <a:r>
-              <a:rPr lang="en-US" b="1" i="0">
-                <a:effectLst/>
+            <a:pPr>
+              <a:lnSpc>
+                <a:spcPct val="150000"/>
+              </a:lnSpc>
+            </a:pPr>
+            <a:r>
+              <a:rPr lang="en-US" sz="1900" dirty="0">
+                <a:latin typeface="Times New Roman" panose="02020603050405020304" pitchFamily="18" charset="0"/>
+                <a:cs typeface="Times New Roman" panose="02020603050405020304" pitchFamily="18" charset="0"/>
               </a:rPr>
-              <a:t>4. Modeling</a:t>
-            </a:r>
-          </a:p>
-        </p:txBody>
-      </p:sp>
-      <p:pic>
-        <p:nvPicPr>
-          <p:cNvPr id="4" name="Picture 3" descr="Chart, line chart&#10;&#10;Description automatically generated">
-            <a:extLst>
-              <a:ext uri="{FF2B5EF4-FFF2-40B4-BE49-F238E27FC236}">
-                <a16:creationId xmlns:a16="http://schemas.microsoft.com/office/drawing/2014/main" id="{A80FFF45-48EF-EA14-7FAF-D4EE9150ACF6}"/>
-              </a:ext>
-            </a:extLst>
-          </p:cNvPr>
-          <p:cNvPicPr>
-            <a:picLocks noChangeAspect="1"/>
-          </p:cNvPicPr>
-          <p:nvPr/>
-        </p:nvPicPr>
-        <p:blipFill>
-          <a:blip r:embed="rId2">
-            <a:extLst>
-              <a:ext uri="{28A0092B-C50C-407E-A947-70E740481C1C}">
-                <a14:useLocalDpi xmlns:a14="http://schemas.microsoft.com/office/drawing/2010/main" val="0"/>
-              </a:ext>
-            </a:extLst>
-          </a:blip>
-          <a:stretch>
-            <a:fillRect/>
-          </a:stretch>
-        </p:blipFill>
-        <p:spPr>
-          <a:xfrm>
-            <a:off x="1066800" y="2536594"/>
-            <a:ext cx="4800600" cy="3153235"/>
-          </a:xfrm>
-          <a:prstGeom prst="rect">
-            <a:avLst/>
-          </a:prstGeom>
-          <a:noFill/>
-        </p:spPr>
-      </p:pic>
-      <p:sp>
-        <p:nvSpPr>
-          <p:cNvPr id="9" name="Content Placeholder 3">
-            <a:extLst>
-              <a:ext uri="{FF2B5EF4-FFF2-40B4-BE49-F238E27FC236}">
-                <a16:creationId xmlns:a16="http://schemas.microsoft.com/office/drawing/2014/main" id="{5F2DABC6-91E7-2535-B5D3-98CD6DF422E4}"/>
-              </a:ext>
-            </a:extLst>
-          </p:cNvPr>
-          <p:cNvSpPr>
-            <a:spLocks noGrp="1"/>
-          </p:cNvSpPr>
-          <p:nvPr>
-            <p:ph sz="half" idx="2"/>
-          </p:nvPr>
-        </p:nvSpPr>
-        <p:spPr>
-          <a:xfrm>
-            <a:off x="6324600" y="1825624"/>
-            <a:ext cx="4800600" cy="4575175"/>
-          </a:xfrm>
-        </p:spPr>
-        <p:txBody>
-          <a:bodyPr/>
-          <a:lstStyle/>
-          <a:p>
-            <a:r>
-              <a:rPr lang="en-US" dirty="0"/>
-              <a:t>The ROC score of the of the Decision Tree is 0.75</a:t>
-            </a:r>
-          </a:p>
-          <a:p>
-            <a:r>
-              <a:rPr lang="en-US" dirty="0"/>
-              <a:t>This </a:t>
-            </a:r>
-            <a:r>
-              <a:rPr lang="en-US"/>
-              <a:t>means that</a:t>
+              <a:t>The methods used to build the classification model are: Logistic Regression, Decision Tree Classifier, and Gaussian Naïve Bayes Classifier.</a:t>
+            </a:r>
+          </a:p>
+          <a:p>
+            <a:pPr>
+              <a:lnSpc>
+                <a:spcPct val="150000"/>
+              </a:lnSpc>
+            </a:pPr>
+            <a:r>
+              <a:rPr lang="en-US" sz="1900" dirty="0">
+                <a:latin typeface="Times New Roman" panose="02020603050405020304" pitchFamily="18" charset="0"/>
+                <a:cs typeface="Times New Roman" panose="02020603050405020304" pitchFamily="18" charset="0"/>
+              </a:rPr>
+              <a:t>All the 3 methods were trained from data prepped from a train split. This ensured that we would have less chances of overfitting the model and having poor performance on the test set.</a:t>
+            </a:r>
+          </a:p>
+          <a:p>
+            <a:pPr>
+              <a:lnSpc>
+                <a:spcPct val="150000"/>
+              </a:lnSpc>
+            </a:pPr>
+            <a:r>
+              <a:rPr lang="en-US" sz="1900" dirty="0">
+                <a:latin typeface="Times New Roman" panose="02020603050405020304" pitchFamily="18" charset="0"/>
+                <a:cs typeface="Times New Roman" panose="02020603050405020304" pitchFamily="18" charset="0"/>
+              </a:rPr>
+              <a:t>Each of the methods had their own levels of tuning with their own respective hyperparameters. The models underwent training through grid search cross validation hence the result is the best potential fit out of the give parameters and hyperparameters.</a:t>
             </a:r>
           </a:p>
         </p:txBody>
@@ -4777,7 +4910,7 @@
     </p:spTree>
     <p:extLst>
       <p:ext uri="{BB962C8B-B14F-4D97-AF65-F5344CB8AC3E}">
-        <p14:creationId xmlns:p14="http://schemas.microsoft.com/office/powerpoint/2010/main" val="263299270"/>
+        <p14:creationId xmlns:p14="http://schemas.microsoft.com/office/powerpoint/2010/main" val="1689957781"/>
       </p:ext>
     </p:extLst>
   </p:cSld>
@@ -4839,10 +4972,10 @@
           <a:lstStyle/>
           <a:p>
             <a:r>
-              <a:rPr lang="en-US" b="1" i="0">
+              <a:rPr lang="en-US" b="1" i="0" dirty="0">
                 <a:effectLst/>
               </a:rPr>
-              <a:t>4. Modeling</a:t>
+              <a:t>4. Results</a:t>
             </a:r>
           </a:p>
         </p:txBody>
@@ -4852,7 +4985,7 @@
           <p:cNvPr id="4" name="Picture 3" descr="Chart, line chart&#10;&#10;Description automatically generated">
             <a:extLst>
               <a:ext uri="{FF2B5EF4-FFF2-40B4-BE49-F238E27FC236}">
-                <a16:creationId xmlns:a16="http://schemas.microsoft.com/office/drawing/2014/main" id="{1E72942A-7992-1911-928B-C2776FDD3F56}"/>
+                <a16:creationId xmlns:a16="http://schemas.microsoft.com/office/drawing/2014/main" id="{A80FFF45-48EF-EA14-7FAF-D4EE9150ACF6}"/>
               </a:ext>
             </a:extLst>
           </p:cNvPr>
@@ -4875,8 +5008,8 @@
         </p:blipFill>
         <p:spPr>
           <a:xfrm>
-            <a:off x="1066800" y="2414785"/>
-            <a:ext cx="4800600" cy="3396852"/>
+            <a:off x="1066800" y="2536594"/>
+            <a:ext cx="4800600" cy="3153235"/>
           </a:xfrm>
           <a:prstGeom prst="rect">
             <a:avLst/>
@@ -4889,7 +5022,7 @@
           <p:cNvPr id="9" name="Content Placeholder 3">
             <a:extLst>
               <a:ext uri="{FF2B5EF4-FFF2-40B4-BE49-F238E27FC236}">
-                <a16:creationId xmlns:a16="http://schemas.microsoft.com/office/drawing/2014/main" id="{24F16D62-898A-3795-D37A-5ED7F9D6E06F}"/>
+                <a16:creationId xmlns:a16="http://schemas.microsoft.com/office/drawing/2014/main" id="{5F2DABC6-91E7-2535-B5D3-98CD6DF422E4}"/>
               </a:ext>
             </a:extLst>
           </p:cNvPr>
@@ -4907,17 +5040,44 @@
           </a:xfrm>
         </p:spPr>
         <p:txBody>
-          <a:bodyPr/>
+          <a:bodyPr>
+            <a:normAutofit/>
+          </a:bodyPr>
           <a:lstStyle/>
           <a:p>
-            <a:endParaRPr lang="en-US"/>
+            <a:pPr>
+              <a:lnSpc>
+                <a:spcPct val="150000"/>
+              </a:lnSpc>
+            </a:pPr>
+            <a:r>
+              <a:rPr lang="en-US" sz="1900" dirty="0">
+                <a:latin typeface="Times New Roman" panose="02020603050405020304" pitchFamily="18" charset="0"/>
+                <a:cs typeface="Times New Roman" panose="02020603050405020304" pitchFamily="18" charset="0"/>
+              </a:rPr>
+              <a:t>When the data was fit onto a Decision tree classifier and the model used to predict test data, the ROC was 0.75.</a:t>
+            </a:r>
+          </a:p>
+          <a:p>
+            <a:pPr>
+              <a:lnSpc>
+                <a:spcPct val="150000"/>
+              </a:lnSpc>
+            </a:pPr>
+            <a:r>
+              <a:rPr lang="en-US" sz="1900" dirty="0">
+                <a:latin typeface="Times New Roman" panose="02020603050405020304" pitchFamily="18" charset="0"/>
+                <a:cs typeface="Times New Roman" panose="02020603050405020304" pitchFamily="18" charset="0"/>
+              </a:rPr>
+              <a:t>The outcome was generally very good, however, there are more models available, hence it was important to know if this model had the best predictive ability or there was a chance to get a better mapping.</a:t>
+            </a:r>
           </a:p>
         </p:txBody>
       </p:sp>
     </p:spTree>
     <p:extLst>
       <p:ext uri="{BB962C8B-B14F-4D97-AF65-F5344CB8AC3E}">
-        <p14:creationId xmlns:p14="http://schemas.microsoft.com/office/powerpoint/2010/main" val="1596114307"/>
+        <p14:creationId xmlns:p14="http://schemas.microsoft.com/office/powerpoint/2010/main" val="263299270"/>
       </p:ext>
     </p:extLst>
   </p:cSld>
@@ -4979,10 +5139,10 @@
           <a:lstStyle/>
           <a:p>
             <a:r>
-              <a:rPr lang="en-US" b="1" i="0">
+              <a:rPr lang="en-US" b="1" i="0" dirty="0">
                 <a:effectLst/>
               </a:rPr>
-              <a:t>4. Modeling</a:t>
+              <a:t>4. Results</a:t>
             </a:r>
           </a:p>
         </p:txBody>
@@ -4992,7 +5152,7 @@
           <p:cNvPr id="4" name="Picture 3" descr="Chart, line chart&#10;&#10;Description automatically generated">
             <a:extLst>
               <a:ext uri="{FF2B5EF4-FFF2-40B4-BE49-F238E27FC236}">
-                <a16:creationId xmlns:a16="http://schemas.microsoft.com/office/drawing/2014/main" id="{DF027D1C-C8D5-CF1C-CCE1-75134B37BBEA}"/>
+                <a16:creationId xmlns:a16="http://schemas.microsoft.com/office/drawing/2014/main" id="{1E72942A-7992-1911-928B-C2776FDD3F56}"/>
               </a:ext>
             </a:extLst>
           </p:cNvPr>
@@ -5015,8 +5175,8 @@
         </p:blipFill>
         <p:spPr>
           <a:xfrm>
-            <a:off x="1066800" y="2475719"/>
-            <a:ext cx="4800600" cy="3274985"/>
+            <a:off x="1066800" y="2414785"/>
+            <a:ext cx="4800600" cy="3396852"/>
           </a:xfrm>
           <a:prstGeom prst="rect">
             <a:avLst/>
@@ -5029,7 +5189,7 @@
           <p:cNvPr id="9" name="Content Placeholder 3">
             <a:extLst>
               <a:ext uri="{FF2B5EF4-FFF2-40B4-BE49-F238E27FC236}">
-                <a16:creationId xmlns:a16="http://schemas.microsoft.com/office/drawing/2014/main" id="{E44A4FBA-7D92-CA63-459F-9364539BF4D6}"/>
+                <a16:creationId xmlns:a16="http://schemas.microsoft.com/office/drawing/2014/main" id="{24F16D62-898A-3795-D37A-5ED7F9D6E06F}"/>
               </a:ext>
             </a:extLst>
           </p:cNvPr>
@@ -5047,17 +5207,44 @@
           </a:xfrm>
         </p:spPr>
         <p:txBody>
-          <a:bodyPr/>
+          <a:bodyPr>
+            <a:normAutofit/>
+          </a:bodyPr>
           <a:lstStyle/>
           <a:p>
-            <a:endParaRPr lang="en-US"/>
+            <a:pPr>
+              <a:lnSpc>
+                <a:spcPct val="150000"/>
+              </a:lnSpc>
+            </a:pPr>
+            <a:r>
+              <a:rPr lang="en-US" sz="1900" dirty="0">
+                <a:latin typeface="Times New Roman" panose="02020603050405020304" pitchFamily="18" charset="0"/>
+                <a:cs typeface="Times New Roman" panose="02020603050405020304" pitchFamily="18" charset="0"/>
+              </a:rPr>
+              <a:t>When Gaussian Naïve Bayes was used to predict the test data, the overall outcome wasn’t better than the decision tree.</a:t>
+            </a:r>
+          </a:p>
+          <a:p>
+            <a:pPr>
+              <a:lnSpc>
+                <a:spcPct val="150000"/>
+              </a:lnSpc>
+            </a:pPr>
+            <a:r>
+              <a:rPr lang="en-US" sz="1900" dirty="0">
+                <a:latin typeface="Times New Roman" panose="02020603050405020304" pitchFamily="18" charset="0"/>
+                <a:cs typeface="Times New Roman" panose="02020603050405020304" pitchFamily="18" charset="0"/>
+              </a:rPr>
+              <a:t>The difference wasn’t much to complain about, however, the search for a better model was still on. </a:t>
+            </a:r>
           </a:p>
         </p:txBody>
       </p:sp>
     </p:spTree>
     <p:extLst>
       <p:ext uri="{BB962C8B-B14F-4D97-AF65-F5344CB8AC3E}">
-        <p14:creationId xmlns:p14="http://schemas.microsoft.com/office/powerpoint/2010/main" val="37246192"/>
+        <p14:creationId xmlns:p14="http://schemas.microsoft.com/office/powerpoint/2010/main" val="1596114307"/>
       </p:ext>
     </p:extLst>
   </p:cSld>
@@ -5098,13 +5285,7 @@
       </p:grpSpPr>
       <p:sp>
         <p:nvSpPr>
-          <p:cNvPr id="11" name="Title 1">
-            <a:extLst>
-              <a:ext uri="{FF2B5EF4-FFF2-40B4-BE49-F238E27FC236}">
-                <a16:creationId xmlns:a16="http://schemas.microsoft.com/office/drawing/2014/main" id="{78C49FFF-AD89-0908-F61F-67ADCBEEF8B2}"/>
-              </a:ext>
-            </a:extLst>
-          </p:cNvPr>
+          <p:cNvPr id="2" name="Title 1"/>
           <p:cNvSpPr>
             <a:spLocks noGrp="1"/>
           </p:cNvSpPr>
@@ -5119,50 +5300,118 @@
           </a:xfrm>
         </p:spPr>
         <p:txBody>
-          <a:bodyPr/>
+          <a:bodyPr anchor="ctr">
+            <a:normAutofit/>
+          </a:bodyPr>
           <a:lstStyle/>
           <a:p>
             <a:r>
-              <a:rPr lang="en-US" dirty="0"/>
-              <a:t>Conclusion</a:t>
-            </a:r>
-          </a:p>
-        </p:txBody>
-      </p:sp>
-      <p:sp>
-        <p:nvSpPr>
-          <p:cNvPr id="13" name="Content Placeholder 2">
+              <a:rPr lang="en-US" b="1" i="0" dirty="0">
+                <a:effectLst/>
+              </a:rPr>
+              <a:t>4. Results</a:t>
+            </a:r>
+          </a:p>
+        </p:txBody>
+      </p:sp>
+      <p:pic>
+        <p:nvPicPr>
+          <p:cNvPr id="4" name="Picture 3" descr="Chart, line chart&#10;&#10;Description automatically generated">
             <a:extLst>
               <a:ext uri="{FF2B5EF4-FFF2-40B4-BE49-F238E27FC236}">
-                <a16:creationId xmlns:a16="http://schemas.microsoft.com/office/drawing/2014/main" id="{C06FE100-7545-A1C5-D714-3F554B949A54}"/>
+                <a16:creationId xmlns:a16="http://schemas.microsoft.com/office/drawing/2014/main" id="{DF027D1C-C8D5-CF1C-CCE1-75134B37BBEA}"/>
               </a:ext>
             </a:extLst>
           </p:cNvPr>
-          <p:cNvSpPr>
-            <a:spLocks noGrp="1"/>
-          </p:cNvSpPr>
-          <p:nvPr>
-            <p:ph idx="1"/>
-          </p:nvPr>
-        </p:nvSpPr>
+          <p:cNvPicPr>
+            <a:picLocks noChangeAspect="1"/>
+          </p:cNvPicPr>
+          <p:nvPr/>
+        </p:nvPicPr>
+        <p:blipFill>
+          <a:blip r:embed="rId2">
+            <a:extLst>
+              <a:ext uri="{28A0092B-C50C-407E-A947-70E740481C1C}">
+                <a14:useLocalDpi xmlns:a14="http://schemas.microsoft.com/office/drawing/2010/main" val="0"/>
+              </a:ext>
+            </a:extLst>
+          </a:blip>
+          <a:stretch>
+            <a:fillRect/>
+          </a:stretch>
+        </p:blipFill>
         <p:spPr>
           <a:xfrm>
-            <a:off x="1524000" y="1828799"/>
-            <a:ext cx="9144000" cy="4572001"/>
+            <a:off x="1066800" y="2475719"/>
+            <a:ext cx="4800600" cy="3274985"/>
+          </a:xfrm>
+          <a:prstGeom prst="rect">
+            <a:avLst/>
+          </a:prstGeom>
+          <a:noFill/>
+        </p:spPr>
+      </p:pic>
+      <p:sp>
+        <p:nvSpPr>
+          <p:cNvPr id="9" name="Content Placeholder 3">
+            <a:extLst>
+              <a:ext uri="{FF2B5EF4-FFF2-40B4-BE49-F238E27FC236}">
+                <a16:creationId xmlns:a16="http://schemas.microsoft.com/office/drawing/2014/main" id="{E44A4FBA-7D92-CA63-459F-9364539BF4D6}"/>
+              </a:ext>
+            </a:extLst>
+          </p:cNvPr>
+          <p:cNvSpPr>
+            <a:spLocks noGrp="1"/>
+          </p:cNvSpPr>
+          <p:nvPr>
+            <p:ph sz="half" idx="2"/>
+          </p:nvPr>
+        </p:nvSpPr>
+        <p:spPr>
+          <a:xfrm>
+            <a:off x="6324600" y="1825624"/>
+            <a:ext cx="4800600" cy="4575175"/>
           </a:xfrm>
         </p:spPr>
         <p:txBody>
-          <a:bodyPr/>
+          <a:bodyPr>
+            <a:normAutofit/>
+          </a:bodyPr>
           <a:lstStyle/>
           <a:p>
-            <a:endParaRPr lang="en-US" dirty="0"/>
+            <a:pPr>
+              <a:lnSpc>
+                <a:spcPct val="150000"/>
+              </a:lnSpc>
+            </a:pPr>
+            <a:r>
+              <a:rPr lang="en-US" sz="1900" dirty="0">
+                <a:latin typeface="Times New Roman" panose="02020603050405020304" pitchFamily="18" charset="0"/>
+                <a:cs typeface="Times New Roman" panose="02020603050405020304" pitchFamily="18" charset="0"/>
+              </a:rPr>
+              <a:t>Finally, which was a tweak of the baseline, the tuned logistic regression. It performed the best out of the models created to fit the binary classification in the project.</a:t>
+            </a:r>
+          </a:p>
+          <a:p>
+            <a:pPr>
+              <a:lnSpc>
+                <a:spcPct val="150000"/>
+              </a:lnSpc>
+            </a:pPr>
+            <a:r>
+              <a:rPr lang="en-US" sz="1900" dirty="0">
+                <a:latin typeface="Times New Roman" panose="02020603050405020304" pitchFamily="18" charset="0"/>
+                <a:cs typeface="Times New Roman" panose="02020603050405020304" pitchFamily="18" charset="0"/>
+              </a:rPr>
+              <a:t>This is what I would use when it would come to prediction of who has or hasn’t received the seasonal flu vaccine. With a ROC of about 0.8, I feel this is an acceptable range of fit for the model to be public.</a:t>
+            </a:r>
           </a:p>
         </p:txBody>
       </p:sp>
     </p:spTree>
     <p:extLst>
       <p:ext uri="{BB962C8B-B14F-4D97-AF65-F5344CB8AC3E}">
-        <p14:creationId xmlns:p14="http://schemas.microsoft.com/office/powerpoint/2010/main" val="1001865620"/>
+        <p14:creationId xmlns:p14="http://schemas.microsoft.com/office/powerpoint/2010/main" val="37246192"/>
       </p:ext>
     </p:extLst>
   </p:cSld>

</xml_diff>